<commit_message>
Corrected DSC configuration script where SAP files are downloaded.  Also, includes minor updates to a couple of presentations from the workshop.
</commit_message>
<xml_diff>
--- a/Presentations/Infrastructure as Code.pptx
+++ b/Presentations/Infrastructure as Code.pptx
@@ -9988,7 +9988,7 @@
           <a:p>
             <a:r>
               <a:rPr lang="en-US" dirty="0"/>
-              <a:t>Programmatic</a:t>
+              <a:t>Imperative</a:t>
             </a:r>
           </a:p>
           <a:p>
@@ -10029,7 +10029,7 @@
           <a:p>
             <a:r>
               <a:rPr lang="en-US" dirty="0"/>
-              <a:t>Descriptive</a:t>
+              <a:t>Declarative</a:t>
             </a:r>
           </a:p>
           <a:p>
@@ -11275,7 +11275,7 @@
         </p:spPr>
         <p:txBody>
           <a:bodyPr wrap="square" lIns="182880" tIns="146304" rIns="182880" bIns="146304" rtlCol="0">
-            <a:normAutofit lnSpcReduction="10000"/>
+            <a:normAutofit/>
           </a:bodyPr>
           <a:lstStyle/>
           <a:p>
@@ -11411,68 +11411,13 @@
             </a:r>
           </a:p>
           <a:p>
-            <a:pPr marL="342900" indent="-342900">
+            <a:pPr>
               <a:lnSpc>
                 <a:spcPct val="90000"/>
               </a:lnSpc>
               <a:spcAft>
                 <a:spcPts val="600"/>
               </a:spcAft>
-              <a:buFont typeface="Arial" panose="020B0604020202020204" pitchFamily="34" charset="0"/>
-              <a:buChar char="•"/>
-            </a:pPr>
-            <a:endParaRPr lang="en-US" sz="2400" dirty="0">
-              <a:gradFill>
-                <a:gsLst>
-                  <a:gs pos="2917">
-                    <a:schemeClr val="tx1"/>
-                  </a:gs>
-                  <a:gs pos="30000">
-                    <a:schemeClr val="tx1"/>
-                  </a:gs>
-                </a:gsLst>
-                <a:lin ang="5400000" scaled="0"/>
-              </a:gradFill>
-            </a:endParaRPr>
-          </a:p>
-          <a:p>
-            <a:pPr marL="342900" indent="-342900">
-              <a:lnSpc>
-                <a:spcPct val="90000"/>
-              </a:lnSpc>
-              <a:spcAft>
-                <a:spcPts val="600"/>
-              </a:spcAft>
-              <a:buFont typeface="Arial" panose="020B0604020202020204" pitchFamily="34" charset="0"/>
-              <a:buChar char="•"/>
-            </a:pPr>
-            <a:r>
-              <a:rPr lang="en-US" sz="2400" dirty="0">
-                <a:gradFill>
-                  <a:gsLst>
-                    <a:gs pos="2917">
-                      <a:schemeClr val="tx1"/>
-                    </a:gs>
-                    <a:gs pos="30000">
-                      <a:schemeClr val="tx1"/>
-                    </a:gs>
-                  </a:gsLst>
-                  <a:lin ang="5400000" scaled="0"/>
-                </a:gradFill>
-              </a:rPr>
-              <a:t>Declarative</a:t>
-            </a:r>
-          </a:p>
-          <a:p>
-            <a:pPr marL="342900" indent="-342900">
-              <a:lnSpc>
-                <a:spcPct val="90000"/>
-              </a:lnSpc>
-              <a:spcAft>
-                <a:spcPts val="600"/>
-              </a:spcAft>
-              <a:buFont typeface="Arial" panose="020B0604020202020204" pitchFamily="34" charset="0"/>
-              <a:buChar char="•"/>
             </a:pPr>
             <a:endParaRPr lang="en-US" sz="2400" dirty="0">
               <a:gradFill>
@@ -12455,7 +12400,15 @@
             <a:pPr marL="336145" lvl="1" indent="-336145"/>
             <a:r>
               <a:rPr lang="en-US" dirty="0"/>
-              <a:t>JSON files – “Infrastructure-as-code”</a:t>
+              <a:t>JSON files – </a:t>
+            </a:r>
+            <a:r>
+              <a:rPr lang="en-US"/>
+              <a:t>“Infrastructure-as-Code</a:t>
+            </a:r>
+            <a:r>
+              <a:rPr lang="en-US" dirty="0"/>
+              <a:t>”</a:t>
             </a:r>
           </a:p>
           <a:p>
@@ -12489,6 +12442,13 @@
             <a:r>
               <a:rPr lang="en-US" dirty="0"/>
               <a:t>Desired State Configuration (DSC) Script and DSC Resources</a:t>
+            </a:r>
+          </a:p>
+          <a:p>
+            <a:pPr lvl="3"/>
+            <a:r>
+              <a:rPr lang="en-US" dirty="0"/>
+              <a:t>Also “Infrastructure-as-Code”</a:t>
             </a:r>
           </a:p>
           <a:p>
@@ -12674,6 +12634,37 @@
                                           <p:spTgt spid="3">
                                             <p:txEl>
                                               <p:pRg st="6" end="6"/>
+                                            </p:txEl>
+                                          </p:spTgt>
+                                        </p:tgtEl>
+                                        <p:attrNameLst>
+                                          <p:attrName>style.visibility</p:attrName>
+                                        </p:attrNameLst>
+                                      </p:cBhvr>
+                                      <p:to>
+                                        <p:strVal val="visible"/>
+                                      </p:to>
+                                    </p:set>
+                                  </p:childTnLst>
+                                </p:cTn>
+                              </p:par>
+                              <p:par>
+                                <p:cTn id="15" presetID="1" presetClass="entr" presetSubtype="0" fill="hold" nodeType="withEffect">
+                                  <p:stCondLst>
+                                    <p:cond delay="0"/>
+                                  </p:stCondLst>
+                                  <p:childTnLst>
+                                    <p:set>
+                                      <p:cBhvr>
+                                        <p:cTn id="16" dur="1" fill="hold">
+                                          <p:stCondLst>
+                                            <p:cond delay="0"/>
+                                          </p:stCondLst>
+                                        </p:cTn>
+                                        <p:tgtEl>
+                                          <p:spTgt spid="3">
+                                            <p:txEl>
+                                              <p:pRg st="7" end="7"/>
                                             </p:txEl>
                                           </p:spTgt>
                                         </p:tgtEl>

</xml_diff>